<commit_message>
Added comment in the table describing the data used.
</commit_message>
<xml_diff>
--- a/chapter_03/figures/orography.pptx
+++ b/chapter_03/figures/orography.pptx
@@ -125,12 +125,12 @@
   <pc:docChgLst>
     <pc:chgData name="Fatima Pillosu" userId="a6295d4dc9e22643" providerId="LiveId" clId="{F48B3271-E527-486D-9A38-486269C687BA}"/>
     <pc:docChg chg="undo custSel modSld">
-      <pc:chgData name="Fatima Pillosu" userId="a6295d4dc9e22643" providerId="LiveId" clId="{F48B3271-E527-486D-9A38-486269C687BA}" dt="2025-05-26T06:00:49.059" v="938" actId="207"/>
+      <pc:chgData name="Fatima Pillosu" userId="a6295d4dc9e22643" providerId="LiveId" clId="{F48B3271-E527-486D-9A38-486269C687BA}" dt="2025-05-26T07:03:28.864" v="956" actId="115"/>
       <pc:docMkLst>
         <pc:docMk/>
       </pc:docMkLst>
       <pc:sldChg chg="addSp delSp modSp mod">
-        <pc:chgData name="Fatima Pillosu" userId="a6295d4dc9e22643" providerId="LiveId" clId="{F48B3271-E527-486D-9A38-486269C687BA}" dt="2025-05-26T06:00:49.059" v="938" actId="207"/>
+        <pc:chgData name="Fatima Pillosu" userId="a6295d4dc9e22643" providerId="LiveId" clId="{F48B3271-E527-486D-9A38-486269C687BA}" dt="2025-05-26T07:03:28.864" v="956" actId="115"/>
         <pc:sldMkLst>
           <pc:docMk/>
           <pc:sldMk cId="1822901782" sldId="256"/>
@@ -2136,7 +2136,7 @@
           </ac:spMkLst>
         </pc:spChg>
         <pc:spChg chg="add mod">
-          <ac:chgData name="Fatima Pillosu" userId="a6295d4dc9e22643" providerId="LiveId" clId="{F48B3271-E527-486D-9A38-486269C687BA}" dt="2025-05-26T06:00:49.059" v="938" actId="207"/>
+          <ac:chgData name="Fatima Pillosu" userId="a6295d4dc9e22643" providerId="LiveId" clId="{F48B3271-E527-486D-9A38-486269C687BA}" dt="2025-05-26T07:03:28.864" v="956" actId="115"/>
           <ac:spMkLst>
             <pc:docMk/>
             <pc:sldMk cId="1822901782" sldId="256"/>
@@ -7759,7 +7759,7 @@
                 <a:latin typeface="Calibri" panose="020F0502020204030204" pitchFamily="34" charset="0"/>
                 <a:cs typeface="Calibri" panose="020F0502020204030204" pitchFamily="34" charset="0"/>
               </a:rPr>
-              <a:t>ERA5 variables to use in the data-driven model </a:t>
+              <a:t>ERA5 variables used in the data-driven model </a:t>
             </a:r>
           </a:p>
           <a:p>
@@ -7771,7 +7771,7 @@
                 <a:latin typeface="Calibri Light" panose="020F0302020204030204" pitchFamily="34" charset="0"/>
                 <a:cs typeface="Calibri Light" panose="020F0302020204030204" pitchFamily="34" charset="0"/>
               </a:rPr>
-              <a:t>Variables to represent </a:t>
+              <a:t>Variables to represent the </a:t>
             </a:r>
             <a:r>
               <a:rPr lang="en-US" sz="1000" u="sng" dirty="0">
@@ -7783,7 +7783,17 @@
               </a:rPr>
               <a:t>orography</a:t>
             </a:r>
-            <a:endParaRPr lang="en-GB" sz="1000" u="sng" dirty="0">
+            <a:r>
+              <a:rPr lang="en-US" sz="1000" dirty="0">
+                <a:solidFill>
+                  <a:srgbClr val="333333"/>
+                </a:solidFill>
+                <a:latin typeface="Calibri Light" panose="020F0302020204030204" pitchFamily="34" charset="0"/>
+                <a:cs typeface="Calibri Light" panose="020F0302020204030204" pitchFamily="34" charset="0"/>
+              </a:rPr>
+              <a:t> (static)</a:t>
+            </a:r>
+            <a:endParaRPr lang="en-GB" sz="1000" dirty="0">
               <a:solidFill>
                 <a:srgbClr val="333333"/>
               </a:solidFill>

</xml_diff>